<commit_message>
Revert "10.21 차트 import 삭제 사이드바 수정"
This reverts commit df009d60bf80e2f153142a86df1d253b04c59ec1.
</commit_message>
<xml_diff>
--- a/작성중PPT.pptx
+++ b/작성중PPT.pptx
@@ -236,7 +236,7 @@
           <a:p>
             <a:fld id="{39F8523D-909C-47AB-9634-7FC58FD474BA}" type="datetimeFigureOut">
               <a:rPr lang="ko-KR" altLang="en-US" smtClean="0"/>
-              <a:t>2022-10-17</a:t>
+              <a:t>2022-09-29</a:t>
             </a:fld>
             <a:endParaRPr lang="ko-KR" altLang="en-US"/>
           </a:p>
@@ -413,7 +413,7 @@
           <a:p>
             <a:fld id="{D886DEA9-3F93-4CDE-8E05-6171DE86F405}" type="datetimeFigureOut">
               <a:rPr lang="ko-KR" altLang="en-US" smtClean="0"/>
-              <a:t>2022-10-17</a:t>
+              <a:t>2022-09-29</a:t>
             </a:fld>
             <a:endParaRPr lang="ko-KR" altLang="en-US"/>
           </a:p>
@@ -827,7 +827,7 @@
           <a:p>
             <a:fld id="{677C8CFA-8953-43DD-A9E8-8DF74864F225}" type="datetimeFigureOut">
               <a:rPr lang="ko-KR" altLang="en-US" smtClean="0"/>
-              <a:t>2022-10-17</a:t>
+              <a:t>2022-09-29</a:t>
             </a:fld>
             <a:endParaRPr lang="ko-KR" altLang="en-US"/>
           </a:p>
@@ -897,13 +897,13 @@
   <p:clrMapOvr>
     <a:masterClrMapping/>
   </p:clrMapOvr>
-  <mc:AlternateContent xmlns:mc="http://schemas.openxmlformats.org/markup-compatibility/2006">
-    <mc:Choice xmlns:p159="http://schemas.microsoft.com/office/powerpoint/2015/09/main" xmlns="" Requires="p159">
+  <mc:AlternateContent xmlns:mc="http://schemas.openxmlformats.org/markup-compatibility/2006" xmlns:p159="http://schemas.microsoft.com/office/powerpoint/2015/09/main">
+    <mc:Choice Requires="p159">
       <p:transition xmlns:p14="http://schemas.microsoft.com/office/powerpoint/2010/main" spd="slow" p14:dur="2000">
         <p159:morph option="byObject"/>
       </p:transition>
     </mc:Choice>
-    <mc:Fallback>
+    <mc:Fallback xmlns="">
       <p:transition spd="slow">
         <p:fade/>
       </p:transition>
@@ -1127,7 +1127,7 @@
           <a:p>
             <a:fld id="{677C8CFA-8953-43DD-A9E8-8DF74864F225}" type="datetimeFigureOut">
               <a:rPr lang="ko-KR" altLang="en-US" smtClean="0"/>
-              <a:t>2022-10-17</a:t>
+              <a:t>2022-09-29</a:t>
             </a:fld>
             <a:endParaRPr lang="ko-KR" altLang="en-US"/>
           </a:p>
@@ -1197,13 +1197,13 @@
   <p:clrMapOvr>
     <a:masterClrMapping/>
   </p:clrMapOvr>
-  <mc:AlternateContent xmlns:mc="http://schemas.openxmlformats.org/markup-compatibility/2006">
-    <mc:Choice xmlns:p159="http://schemas.microsoft.com/office/powerpoint/2015/09/main" xmlns="" Requires="p159">
+  <mc:AlternateContent xmlns:mc="http://schemas.openxmlformats.org/markup-compatibility/2006" xmlns:p159="http://schemas.microsoft.com/office/powerpoint/2015/09/main">
+    <mc:Choice Requires="p159">
       <p:transition xmlns:p14="http://schemas.microsoft.com/office/powerpoint/2010/main" spd="slow" p14:dur="2000">
         <p159:morph option="byObject"/>
       </p:transition>
     </mc:Choice>
-    <mc:Fallback>
+    <mc:Fallback xmlns="">
       <p:transition spd="slow">
         <p:fade/>
       </p:transition>
@@ -1337,7 +1337,7 @@
           <a:p>
             <a:fld id="{677C8CFA-8953-43DD-A9E8-8DF74864F225}" type="datetimeFigureOut">
               <a:rPr lang="ko-KR" altLang="en-US" smtClean="0"/>
-              <a:t>2022-10-17</a:t>
+              <a:t>2022-09-29</a:t>
             </a:fld>
             <a:endParaRPr lang="ko-KR" altLang="en-US"/>
           </a:p>
@@ -1407,13 +1407,13 @@
   <p:clrMapOvr>
     <a:masterClrMapping/>
   </p:clrMapOvr>
-  <mc:AlternateContent xmlns:mc="http://schemas.openxmlformats.org/markup-compatibility/2006">
-    <mc:Choice xmlns:p159="http://schemas.microsoft.com/office/powerpoint/2015/09/main" xmlns="" Requires="p159">
+  <mc:AlternateContent xmlns:mc="http://schemas.openxmlformats.org/markup-compatibility/2006" xmlns:p159="http://schemas.microsoft.com/office/powerpoint/2015/09/main">
+    <mc:Choice Requires="p159">
       <p:transition xmlns:p14="http://schemas.microsoft.com/office/powerpoint/2010/main" spd="slow" p14:dur="2000">
         <p159:morph option="byObject"/>
       </p:transition>
     </mc:Choice>
-    <mc:Fallback>
+    <mc:Fallback xmlns="">
       <p:transition spd="slow">
         <p:fade/>
       </p:transition>
@@ -1557,7 +1557,7 @@
           <a:p>
             <a:fld id="{677C8CFA-8953-43DD-A9E8-8DF74864F225}" type="datetimeFigureOut">
               <a:rPr lang="ko-KR" altLang="en-US" smtClean="0"/>
-              <a:t>2022-10-17</a:t>
+              <a:t>2022-09-29</a:t>
             </a:fld>
             <a:endParaRPr lang="ko-KR" altLang="en-US"/>
           </a:p>
@@ -1627,13 +1627,13 @@
   <p:clrMapOvr>
     <a:masterClrMapping/>
   </p:clrMapOvr>
-  <mc:AlternateContent xmlns:mc="http://schemas.openxmlformats.org/markup-compatibility/2006">
-    <mc:Choice xmlns:p159="http://schemas.microsoft.com/office/powerpoint/2015/09/main" xmlns="" Requires="p159">
+  <mc:AlternateContent xmlns:mc="http://schemas.openxmlformats.org/markup-compatibility/2006" xmlns:p159="http://schemas.microsoft.com/office/powerpoint/2015/09/main">
+    <mc:Choice Requires="p159">
       <p:transition xmlns:p14="http://schemas.microsoft.com/office/powerpoint/2010/main" spd="slow" p14:dur="2000">
         <p159:morph option="byObject"/>
       </p:transition>
     </mc:Choice>
-    <mc:Fallback>
+    <mc:Fallback xmlns="">
       <p:transition spd="slow">
         <p:fade/>
       </p:transition>
@@ -1767,7 +1767,7 @@
           <a:p>
             <a:fld id="{677C8CFA-8953-43DD-A9E8-8DF74864F225}" type="datetimeFigureOut">
               <a:rPr lang="ko-KR" altLang="en-US" smtClean="0"/>
-              <a:t>2022-10-17</a:t>
+              <a:t>2022-09-29</a:t>
             </a:fld>
             <a:endParaRPr lang="ko-KR" altLang="en-US"/>
           </a:p>
@@ -1837,13 +1837,13 @@
   <p:clrMapOvr>
     <a:masterClrMapping/>
   </p:clrMapOvr>
-  <mc:AlternateContent xmlns:mc="http://schemas.openxmlformats.org/markup-compatibility/2006">
-    <mc:Choice xmlns:p159="http://schemas.microsoft.com/office/powerpoint/2015/09/main" xmlns="" Requires="p159">
+  <mc:AlternateContent xmlns:mc="http://schemas.openxmlformats.org/markup-compatibility/2006" xmlns:p159="http://schemas.microsoft.com/office/powerpoint/2015/09/main">
+    <mc:Choice Requires="p159">
       <p:transition xmlns:p14="http://schemas.microsoft.com/office/powerpoint/2010/main" spd="slow" p14:dur="2000">
         <p159:morph option="byObject"/>
       </p:transition>
     </mc:Choice>
-    <mc:Fallback>
+    <mc:Fallback xmlns="">
       <p:transition spd="slow">
         <p:fade/>
       </p:transition>
@@ -2054,7 +2054,7 @@
           <a:p>
             <a:fld id="{677C8CFA-8953-43DD-A9E8-8DF74864F225}" type="datetimeFigureOut">
               <a:rPr lang="ko-KR" altLang="en-US" smtClean="0"/>
-              <a:t>2022-10-17</a:t>
+              <a:t>2022-09-29</a:t>
             </a:fld>
             <a:endParaRPr lang="ko-KR" altLang="en-US"/>
           </a:p>
@@ -2124,13 +2124,13 @@
   <p:clrMapOvr>
     <a:masterClrMapping/>
   </p:clrMapOvr>
-  <mc:AlternateContent xmlns:mc="http://schemas.openxmlformats.org/markup-compatibility/2006">
-    <mc:Choice xmlns:p159="http://schemas.microsoft.com/office/powerpoint/2015/09/main" xmlns="" Requires="p159">
+  <mc:AlternateContent xmlns:mc="http://schemas.openxmlformats.org/markup-compatibility/2006" xmlns:p159="http://schemas.microsoft.com/office/powerpoint/2015/09/main">
+    <mc:Choice Requires="p159">
       <p:transition xmlns:p14="http://schemas.microsoft.com/office/powerpoint/2010/main" spd="slow" p14:dur="2000">
         <p159:morph option="byObject"/>
       </p:transition>
     </mc:Choice>
-    <mc:Fallback>
+    <mc:Fallback xmlns="">
       <p:transition spd="slow">
         <p:fade/>
       </p:transition>
@@ -2331,7 +2331,7 @@
           <a:p>
             <a:fld id="{677C8CFA-8953-43DD-A9E8-8DF74864F225}" type="datetimeFigureOut">
               <a:rPr lang="ko-KR" altLang="en-US" smtClean="0"/>
-              <a:t>2022-10-17</a:t>
+              <a:t>2022-09-29</a:t>
             </a:fld>
             <a:endParaRPr lang="ko-KR" altLang="en-US"/>
           </a:p>
@@ -2401,13 +2401,13 @@
   <p:clrMapOvr>
     <a:masterClrMapping/>
   </p:clrMapOvr>
-  <mc:AlternateContent xmlns:mc="http://schemas.openxmlformats.org/markup-compatibility/2006">
-    <mc:Choice xmlns:p159="http://schemas.microsoft.com/office/powerpoint/2015/09/main" xmlns="" Requires="p159">
+  <mc:AlternateContent xmlns:mc="http://schemas.openxmlformats.org/markup-compatibility/2006" xmlns:p159="http://schemas.microsoft.com/office/powerpoint/2015/09/main">
+    <mc:Choice Requires="p159">
       <p:transition xmlns:p14="http://schemas.microsoft.com/office/powerpoint/2010/main" spd="slow" p14:dur="2000">
         <p159:morph option="byObject"/>
       </p:transition>
     </mc:Choice>
-    <mc:Fallback>
+    <mc:Fallback xmlns="">
       <p:transition spd="slow">
         <p:fade/>
       </p:transition>
@@ -2755,7 +2755,7 @@
           <a:p>
             <a:fld id="{677C8CFA-8953-43DD-A9E8-8DF74864F225}" type="datetimeFigureOut">
               <a:rPr lang="ko-KR" altLang="en-US" smtClean="0"/>
-              <a:t>2022-10-17</a:t>
+              <a:t>2022-09-29</a:t>
             </a:fld>
             <a:endParaRPr lang="ko-KR" altLang="en-US"/>
           </a:p>
@@ -2825,13 +2825,13 @@
   <p:clrMapOvr>
     <a:masterClrMapping/>
   </p:clrMapOvr>
-  <mc:AlternateContent xmlns:mc="http://schemas.openxmlformats.org/markup-compatibility/2006">
-    <mc:Choice xmlns:p159="http://schemas.microsoft.com/office/powerpoint/2015/09/main" xmlns="" Requires="p159">
+  <mc:AlternateContent xmlns:mc="http://schemas.openxmlformats.org/markup-compatibility/2006" xmlns:p159="http://schemas.microsoft.com/office/powerpoint/2015/09/main">
+    <mc:Choice Requires="p159">
       <p:transition xmlns:p14="http://schemas.microsoft.com/office/powerpoint/2010/main" spd="slow" p14:dur="2000">
         <p159:morph option="byObject"/>
       </p:transition>
     </mc:Choice>
-    <mc:Fallback>
+    <mc:Fallback xmlns="">
       <p:transition spd="slow">
         <p:fade/>
       </p:transition>
@@ -2908,7 +2908,7 @@
           <a:p>
             <a:fld id="{677C8CFA-8953-43DD-A9E8-8DF74864F225}" type="datetimeFigureOut">
               <a:rPr lang="ko-KR" altLang="en-US" smtClean="0"/>
-              <a:t>2022-10-17</a:t>
+              <a:t>2022-09-29</a:t>
             </a:fld>
             <a:endParaRPr lang="ko-KR" altLang="en-US"/>
           </a:p>
@@ -2978,13 +2978,13 @@
   <p:clrMapOvr>
     <a:masterClrMapping/>
   </p:clrMapOvr>
-  <mc:AlternateContent xmlns:mc="http://schemas.openxmlformats.org/markup-compatibility/2006">
-    <mc:Choice xmlns:p159="http://schemas.microsoft.com/office/powerpoint/2015/09/main" xmlns="" Requires="p159">
+  <mc:AlternateContent xmlns:mc="http://schemas.openxmlformats.org/markup-compatibility/2006" xmlns:p159="http://schemas.microsoft.com/office/powerpoint/2015/09/main">
+    <mc:Choice Requires="p159">
       <p:transition xmlns:p14="http://schemas.microsoft.com/office/powerpoint/2010/main" spd="slow" p14:dur="2000">
         <p159:morph option="byObject"/>
       </p:transition>
     </mc:Choice>
-    <mc:Fallback>
+    <mc:Fallback xmlns="">
       <p:transition spd="slow">
         <p:fade/>
       </p:transition>
@@ -3033,7 +3033,7 @@
           <a:p>
             <a:fld id="{677C8CFA-8953-43DD-A9E8-8DF74864F225}" type="datetimeFigureOut">
               <a:rPr lang="ko-KR" altLang="en-US" smtClean="0"/>
-              <a:t>2022-10-17</a:t>
+              <a:t>2022-09-29</a:t>
             </a:fld>
             <a:endParaRPr lang="ko-KR" altLang="en-US"/>
           </a:p>
@@ -3103,13 +3103,13 @@
   <p:clrMapOvr>
     <a:masterClrMapping/>
   </p:clrMapOvr>
-  <mc:AlternateContent xmlns:mc="http://schemas.openxmlformats.org/markup-compatibility/2006">
-    <mc:Choice xmlns:p159="http://schemas.microsoft.com/office/powerpoint/2015/09/main" xmlns="" Requires="p159">
+  <mc:AlternateContent xmlns:mc="http://schemas.openxmlformats.org/markup-compatibility/2006" xmlns:p159="http://schemas.microsoft.com/office/powerpoint/2015/09/main">
+    <mc:Choice Requires="p159">
       <p:transition xmlns:p14="http://schemas.microsoft.com/office/powerpoint/2010/main" spd="slow" p14:dur="2000">
         <p159:morph option="byObject"/>
       </p:transition>
     </mc:Choice>
-    <mc:Fallback>
+    <mc:Fallback xmlns="">
       <p:transition spd="slow">
         <p:fade/>
       </p:transition>
@@ -3163,7 +3163,7 @@
           <a:p>
             <a:fld id="{677C8CFA-8953-43DD-A9E8-8DF74864F225}" type="datetimeFigureOut">
               <a:rPr lang="ko-KR" altLang="en-US" smtClean="0"/>
-              <a:t>2022-10-17</a:t>
+              <a:t>2022-09-29</a:t>
             </a:fld>
             <a:endParaRPr lang="ko-KR" altLang="en-US"/>
           </a:p>
@@ -3343,13 +3343,13 @@
   <p:clrMapOvr>
     <a:masterClrMapping/>
   </p:clrMapOvr>
-  <mc:AlternateContent xmlns:mc="http://schemas.openxmlformats.org/markup-compatibility/2006">
-    <mc:Choice xmlns:p159="http://schemas.microsoft.com/office/powerpoint/2015/09/main" xmlns="" Requires="p159">
+  <mc:AlternateContent xmlns:mc="http://schemas.openxmlformats.org/markup-compatibility/2006" xmlns:p159="http://schemas.microsoft.com/office/powerpoint/2015/09/main">
+    <mc:Choice Requires="p159">
       <p:transition xmlns:p14="http://schemas.microsoft.com/office/powerpoint/2010/main" spd="slow" p14:dur="2000">
         <p159:morph option="byObject"/>
       </p:transition>
     </mc:Choice>
-    <mc:Fallback>
+    <mc:Fallback xmlns="">
       <p:transition spd="slow">
         <p:fade/>
       </p:transition>
@@ -3596,7 +3596,7 @@
           <a:p>
             <a:fld id="{677C8CFA-8953-43DD-A9E8-8DF74864F225}" type="datetimeFigureOut">
               <a:rPr lang="ko-KR" altLang="en-US" smtClean="0"/>
-              <a:t>2022-10-17</a:t>
+              <a:t>2022-09-29</a:t>
             </a:fld>
             <a:endParaRPr lang="ko-KR" altLang="en-US"/>
           </a:p>
@@ -3666,13 +3666,13 @@
   <p:clrMapOvr>
     <a:masterClrMapping/>
   </p:clrMapOvr>
-  <mc:AlternateContent xmlns:mc="http://schemas.openxmlformats.org/markup-compatibility/2006">
-    <mc:Choice xmlns:p159="http://schemas.microsoft.com/office/powerpoint/2015/09/main" xmlns="" Requires="p159">
+  <mc:AlternateContent xmlns:mc="http://schemas.openxmlformats.org/markup-compatibility/2006" xmlns:p159="http://schemas.microsoft.com/office/powerpoint/2015/09/main">
+    <mc:Choice Requires="p159">
       <p:transition xmlns:p14="http://schemas.microsoft.com/office/powerpoint/2010/main" spd="slow" p14:dur="2000">
         <p159:morph option="byObject"/>
       </p:transition>
     </mc:Choice>
-    <mc:Fallback>
+    <mc:Fallback xmlns="">
       <p:transition spd="slow">
         <p:fade/>
       </p:transition>
@@ -3849,7 +3849,7 @@
           <a:p>
             <a:fld id="{677C8CFA-8953-43DD-A9E8-8DF74864F225}" type="datetimeFigureOut">
               <a:rPr lang="ko-KR" altLang="en-US" smtClean="0"/>
-              <a:t>2022-10-17</a:t>
+              <a:t>2022-09-29</a:t>
             </a:fld>
             <a:endParaRPr lang="ko-KR" altLang="en-US"/>
           </a:p>
@@ -3967,13 +3967,13 @@
     <p:sldLayoutId id="2147483658" r:id="rId11"/>
     <p:sldLayoutId id="2147483659" r:id="rId12"/>
   </p:sldLayoutIdLst>
-  <mc:AlternateContent xmlns:mc="http://schemas.openxmlformats.org/markup-compatibility/2006">
-    <mc:Choice xmlns:p159="http://schemas.microsoft.com/office/powerpoint/2015/09/main" xmlns="" Requires="p159">
+  <mc:AlternateContent xmlns:mc="http://schemas.openxmlformats.org/markup-compatibility/2006" xmlns:p159="http://schemas.microsoft.com/office/powerpoint/2015/09/main">
+    <mc:Choice Requires="p159">
       <p:transition xmlns:p14="http://schemas.microsoft.com/office/powerpoint/2010/main" spd="slow" p14:dur="2000">
         <p159:morph option="byObject"/>
       </p:transition>
     </mc:Choice>
-    <mc:Fallback>
+    <mc:Fallback xmlns="">
       <p:transition spd="slow">
         <p:fade/>
       </p:transition>
@@ -4503,13 +4503,13 @@
   <p:clrMapOvr>
     <a:masterClrMapping/>
   </p:clrMapOvr>
-  <mc:AlternateContent xmlns:mc="http://schemas.openxmlformats.org/markup-compatibility/2006">
-    <mc:Choice xmlns:p159="http://schemas.microsoft.com/office/powerpoint/2015/09/main" xmlns="" Requires="p159">
+  <mc:AlternateContent xmlns:mc="http://schemas.openxmlformats.org/markup-compatibility/2006" xmlns:p159="http://schemas.microsoft.com/office/powerpoint/2015/09/main">
+    <mc:Choice Requires="p159">
       <p:transition spd="med">
         <p159:morph option="byObject"/>
       </p:transition>
     </mc:Choice>
-    <mc:Fallback>
+    <mc:Fallback xmlns="">
       <p:transition spd="med">
         <p:fade/>
       </p:transition>
@@ -4576,13 +4576,13 @@
   <p:clrMapOvr>
     <a:masterClrMapping/>
   </p:clrMapOvr>
-  <mc:AlternateContent xmlns:mc="http://schemas.openxmlformats.org/markup-compatibility/2006">
-    <mc:Choice xmlns:p159="http://schemas.microsoft.com/office/powerpoint/2015/09/main" xmlns="" Requires="p159">
+  <mc:AlternateContent xmlns:mc="http://schemas.openxmlformats.org/markup-compatibility/2006" xmlns:p159="http://schemas.microsoft.com/office/powerpoint/2015/09/main">
+    <mc:Choice Requires="p159">
       <p:transition spd="med">
         <p159:morph option="byObject"/>
       </p:transition>
     </mc:Choice>
-    <mc:Fallback>
+    <mc:Fallback xmlns="">
       <p:transition spd="med">
         <p:fade/>
       </p:transition>
@@ -4864,13 +4864,13 @@
   <p:clrMapOvr>
     <a:masterClrMapping/>
   </p:clrMapOvr>
-  <mc:AlternateContent xmlns:mc="http://schemas.openxmlformats.org/markup-compatibility/2006">
-    <mc:Choice xmlns:p159="http://schemas.microsoft.com/office/powerpoint/2015/09/main" xmlns="" Requires="p159">
+  <mc:AlternateContent xmlns:mc="http://schemas.openxmlformats.org/markup-compatibility/2006" xmlns:p159="http://schemas.microsoft.com/office/powerpoint/2015/09/main">
+    <mc:Choice Requires="p159">
       <p:transition spd="med">
         <p159:morph option="byObject"/>
       </p:transition>
     </mc:Choice>
-    <mc:Fallback>
+    <mc:Fallback xmlns="">
       <p:transition spd="med">
         <p:fade/>
       </p:transition>
@@ -5697,13 +5697,13 @@
   <p:clrMapOvr>
     <a:masterClrMapping/>
   </p:clrMapOvr>
-  <mc:AlternateContent xmlns:mc="http://schemas.openxmlformats.org/markup-compatibility/2006">
-    <mc:Choice xmlns:p159="http://schemas.microsoft.com/office/powerpoint/2015/09/main" xmlns="" Requires="p159">
+  <mc:AlternateContent xmlns:mc="http://schemas.openxmlformats.org/markup-compatibility/2006" xmlns:p159="http://schemas.microsoft.com/office/powerpoint/2015/09/main">
+    <mc:Choice Requires="p159">
       <p:transition spd="med">
         <p159:morph option="byObject"/>
       </p:transition>
     </mc:Choice>
-    <mc:Fallback>
+    <mc:Fallback xmlns="">
       <p:transition spd="med">
         <p:fade/>
       </p:transition>
@@ -5889,7 +5889,7 @@
         </p:nvSpPr>
         <p:spPr>
           <a:xfrm>
-            <a:off x="1192605" y="4237161"/>
+            <a:off x="1440622" y="4178046"/>
             <a:ext cx="10236200" cy="1790682"/>
           </a:xfrm>
           <a:prstGeom prst="rect">
@@ -6440,7 +6440,7 @@
         </p:nvSpPr>
         <p:spPr>
           <a:xfrm>
-            <a:off x="1384793" y="4178394"/>
+            <a:off x="1440622" y="4178395"/>
             <a:ext cx="5344733" cy="1908215"/>
           </a:xfrm>
           <a:prstGeom prst="rect">
@@ -6546,13 +6546,13 @@
   <p:clrMapOvr>
     <a:masterClrMapping/>
   </p:clrMapOvr>
-  <mc:AlternateContent xmlns:mc="http://schemas.openxmlformats.org/markup-compatibility/2006">
-    <mc:Choice xmlns:p159="http://schemas.microsoft.com/office/powerpoint/2015/09/main" xmlns="" Requires="p159">
+  <mc:AlternateContent xmlns:mc="http://schemas.openxmlformats.org/markup-compatibility/2006" xmlns:p159="http://schemas.microsoft.com/office/powerpoint/2015/09/main">
+    <mc:Choice Requires="p159">
       <p:transition spd="med">
         <p159:morph option="byObject"/>
       </p:transition>
     </mc:Choice>
-    <mc:Fallback>
+    <mc:Fallback xmlns="">
       <p:transition spd="med">
         <p:fade/>
       </p:transition>
@@ -7526,13 +7526,13 @@
   <p:clrMapOvr>
     <a:masterClrMapping/>
   </p:clrMapOvr>
-  <mc:AlternateContent xmlns:mc="http://schemas.openxmlformats.org/markup-compatibility/2006">
-    <mc:Choice xmlns:p159="http://schemas.microsoft.com/office/powerpoint/2015/09/main" xmlns="" Requires="p159">
+  <mc:AlternateContent xmlns:mc="http://schemas.openxmlformats.org/markup-compatibility/2006" xmlns:p159="http://schemas.microsoft.com/office/powerpoint/2015/09/main">
+    <mc:Choice Requires="p159">
       <p:transition spd="med">
         <p159:morph option="byObject"/>
       </p:transition>
     </mc:Choice>
-    <mc:Fallback>
+    <mc:Fallback xmlns="">
       <p:transition spd="med">
         <p:fade/>
       </p:transition>
@@ -9244,13 +9244,13 @@
   <p:clrMapOvr>
     <a:masterClrMapping/>
   </p:clrMapOvr>
-  <mc:AlternateContent xmlns:mc="http://schemas.openxmlformats.org/markup-compatibility/2006">
-    <mc:Choice xmlns:p159="http://schemas.microsoft.com/office/powerpoint/2015/09/main" xmlns="" Requires="p159">
+  <mc:AlternateContent xmlns:mc="http://schemas.openxmlformats.org/markup-compatibility/2006" xmlns:p159="http://schemas.microsoft.com/office/powerpoint/2015/09/main">
+    <mc:Choice Requires="p159">
       <p:transition spd="med">
         <p159:morph option="byObject"/>
       </p:transition>
     </mc:Choice>
-    <mc:Fallback>
+    <mc:Fallback xmlns="">
       <p:transition spd="med">
         <p:fade/>
       </p:transition>
@@ -10662,13 +10662,13 @@
   <p:clrMapOvr>
     <a:masterClrMapping/>
   </p:clrMapOvr>
-  <mc:AlternateContent xmlns:mc="http://schemas.openxmlformats.org/markup-compatibility/2006">
-    <mc:Choice xmlns:p159="http://schemas.microsoft.com/office/powerpoint/2015/09/main" xmlns="" Requires="p159">
+  <mc:AlternateContent xmlns:mc="http://schemas.openxmlformats.org/markup-compatibility/2006" xmlns:p159="http://schemas.microsoft.com/office/powerpoint/2015/09/main">
+    <mc:Choice Requires="p159">
       <p:transition spd="med">
         <p159:morph option="byObject"/>
       </p:transition>
     </mc:Choice>
-    <mc:Fallback>
+    <mc:Fallback xmlns="">
       <p:transition spd="med">
         <p:fade/>
       </p:transition>
@@ -10842,13 +10842,13 @@
   <p:clrMapOvr>
     <a:masterClrMapping/>
   </p:clrMapOvr>
-  <mc:AlternateContent xmlns:mc="http://schemas.openxmlformats.org/markup-compatibility/2006">
-    <mc:Choice xmlns:p159="http://schemas.microsoft.com/office/powerpoint/2015/09/main" xmlns="" Requires="p159">
+  <mc:AlternateContent xmlns:mc="http://schemas.openxmlformats.org/markup-compatibility/2006" xmlns:p159="http://schemas.microsoft.com/office/powerpoint/2015/09/main">
+    <mc:Choice Requires="p159">
       <p:transition spd="med">
         <p159:morph option="byObject"/>
       </p:transition>
     </mc:Choice>
-    <mc:Fallback>
+    <mc:Fallback xmlns="">
       <p:transition spd="med">
         <p:fade/>
       </p:transition>
@@ -11018,13 +11018,13 @@
   <p:clrMapOvr>
     <a:masterClrMapping/>
   </p:clrMapOvr>
-  <mc:AlternateContent xmlns:mc="http://schemas.openxmlformats.org/markup-compatibility/2006">
-    <mc:Choice xmlns:p159="http://schemas.microsoft.com/office/powerpoint/2015/09/main" xmlns="" Requires="p159">
+  <mc:AlternateContent xmlns:mc="http://schemas.openxmlformats.org/markup-compatibility/2006" xmlns:p159="http://schemas.microsoft.com/office/powerpoint/2015/09/main">
+    <mc:Choice Requires="p159">
       <p:transition spd="med">
         <p159:morph option="byObject"/>
       </p:transition>
     </mc:Choice>
-    <mc:Fallback>
+    <mc:Fallback xmlns="">
       <p:transition spd="med">
         <p:fade/>
       </p:transition>
@@ -12210,13 +12210,13 @@
   <p:clrMapOvr>
     <a:masterClrMapping/>
   </p:clrMapOvr>
-  <mc:AlternateContent xmlns:mc="http://schemas.openxmlformats.org/markup-compatibility/2006">
-    <mc:Choice xmlns:p159="http://schemas.microsoft.com/office/powerpoint/2015/09/main" xmlns="" Requires="p159">
+  <mc:AlternateContent xmlns:mc="http://schemas.openxmlformats.org/markup-compatibility/2006" xmlns:p159="http://schemas.microsoft.com/office/powerpoint/2015/09/main">
+    <mc:Choice Requires="p159">
       <p:transition spd="med">
         <p159:morph option="byObject"/>
       </p:transition>
     </mc:Choice>
-    <mc:Fallback>
+    <mc:Fallback xmlns="">
       <p:transition spd="med">
         <p:fade/>
       </p:transition>

</xml_diff>